<commit_message>
Kong Migration Script added
</commit_message>
<xml_diff>
--- a/docs/Firmenverwaltung Services.pptx
+++ b/docs/Firmenverwaltung Services.pptx
@@ -140,6 +140,9 @@
         </p14:section>
       </p14:sectionLst>
     </p:ext>
+    <p:ext uri="{EFAFB233-063F-42B5-8137-9DF3F51BA10A}">
+      <p15:sldGuideLst xmlns:p15="http://schemas.microsoft.com/office/powerpoint/2012/main"/>
+    </p:ext>
   </p:extLst>
 </p:presentation>
 </file>
@@ -291,7 +294,7 @@
           <a:p>
             <a:fld id="{F765DD91-8371-1247-B585-E0879061DF51}" type="datetimeFigureOut">
               <a:rPr lang="de-DE" smtClean="0"/>
-              <a:t>22.02.23</a:t>
+              <a:t>28.02.23</a:t>
             </a:fld>
             <a:endParaRPr lang="de-DE"/>
           </a:p>
@@ -489,7 +492,7 @@
           <a:p>
             <a:fld id="{F765DD91-8371-1247-B585-E0879061DF51}" type="datetimeFigureOut">
               <a:rPr lang="de-DE" smtClean="0"/>
-              <a:t>22.02.23</a:t>
+              <a:t>28.02.23</a:t>
             </a:fld>
             <a:endParaRPr lang="de-DE"/>
           </a:p>
@@ -697,7 +700,7 @@
           <a:p>
             <a:fld id="{F765DD91-8371-1247-B585-E0879061DF51}" type="datetimeFigureOut">
               <a:rPr lang="de-DE" smtClean="0"/>
-              <a:t>22.02.23</a:t>
+              <a:t>28.02.23</a:t>
             </a:fld>
             <a:endParaRPr lang="de-DE"/>
           </a:p>
@@ -895,7 +898,7 @@
           <a:p>
             <a:fld id="{F765DD91-8371-1247-B585-E0879061DF51}" type="datetimeFigureOut">
               <a:rPr lang="de-DE" smtClean="0"/>
-              <a:t>22.02.23</a:t>
+              <a:t>28.02.23</a:t>
             </a:fld>
             <a:endParaRPr lang="de-DE"/>
           </a:p>
@@ -1170,7 +1173,7 @@
           <a:p>
             <a:fld id="{F765DD91-8371-1247-B585-E0879061DF51}" type="datetimeFigureOut">
               <a:rPr lang="de-DE" smtClean="0"/>
-              <a:t>22.02.23</a:t>
+              <a:t>28.02.23</a:t>
             </a:fld>
             <a:endParaRPr lang="de-DE"/>
           </a:p>
@@ -1435,7 +1438,7 @@
           <a:p>
             <a:fld id="{F765DD91-8371-1247-B585-E0879061DF51}" type="datetimeFigureOut">
               <a:rPr lang="de-DE" smtClean="0"/>
-              <a:t>22.02.23</a:t>
+              <a:t>28.02.23</a:t>
             </a:fld>
             <a:endParaRPr lang="de-DE"/>
           </a:p>
@@ -1847,7 +1850,7 @@
           <a:p>
             <a:fld id="{F765DD91-8371-1247-B585-E0879061DF51}" type="datetimeFigureOut">
               <a:rPr lang="de-DE" smtClean="0"/>
-              <a:t>22.02.23</a:t>
+              <a:t>28.02.23</a:t>
             </a:fld>
             <a:endParaRPr lang="de-DE"/>
           </a:p>
@@ -1988,7 +1991,7 @@
           <a:p>
             <a:fld id="{F765DD91-8371-1247-B585-E0879061DF51}" type="datetimeFigureOut">
               <a:rPr lang="de-DE" smtClean="0"/>
-              <a:t>22.02.23</a:t>
+              <a:t>28.02.23</a:t>
             </a:fld>
             <a:endParaRPr lang="de-DE"/>
           </a:p>
@@ -2101,7 +2104,7 @@
           <a:p>
             <a:fld id="{F765DD91-8371-1247-B585-E0879061DF51}" type="datetimeFigureOut">
               <a:rPr lang="de-DE" smtClean="0"/>
-              <a:t>22.02.23</a:t>
+              <a:t>28.02.23</a:t>
             </a:fld>
             <a:endParaRPr lang="de-DE"/>
           </a:p>
@@ -2412,7 +2415,7 @@
           <a:p>
             <a:fld id="{F765DD91-8371-1247-B585-E0879061DF51}" type="datetimeFigureOut">
               <a:rPr lang="de-DE" smtClean="0"/>
-              <a:t>22.02.23</a:t>
+              <a:t>28.02.23</a:t>
             </a:fld>
             <a:endParaRPr lang="de-DE"/>
           </a:p>
@@ -2700,7 +2703,7 @@
           <a:p>
             <a:fld id="{F765DD91-8371-1247-B585-E0879061DF51}" type="datetimeFigureOut">
               <a:rPr lang="de-DE" smtClean="0"/>
-              <a:t>22.02.23</a:t>
+              <a:t>28.02.23</a:t>
             </a:fld>
             <a:endParaRPr lang="de-DE"/>
           </a:p>
@@ -2941,7 +2944,7 @@
           <a:p>
             <a:fld id="{F765DD91-8371-1247-B585-E0879061DF51}" type="datetimeFigureOut">
               <a:rPr lang="de-DE" smtClean="0"/>
-              <a:t>22.02.23</a:t>
+              <a:t>28.02.23</a:t>
             </a:fld>
             <a:endParaRPr lang="de-DE"/>
           </a:p>
@@ -3512,6 +3515,29 @@
             <a:endParaRPr lang="de-DE" dirty="0"/>
           </a:p>
           <a:p>
+            <a:r>
+              <a:rPr lang="de-DE" dirty="0"/>
+              <a:t>Benutzerverwaltung</a:t>
+            </a:r>
+          </a:p>
+          <a:p>
+            <a:r>
+              <a:rPr lang="de-DE" dirty="0"/>
+              <a:t>Durch API Gateway unabhängig zu </a:t>
+            </a:r>
+            <a:r>
+              <a:rPr lang="de-DE" dirty="0" err="1"/>
+              <a:t>Servies</a:t>
+            </a:r>
+            <a:endParaRPr lang="de-DE" dirty="0"/>
+          </a:p>
+          <a:p>
+            <a:pPr marL="0" indent="0">
+              <a:buNone/>
+            </a:pPr>
+            <a:endParaRPr lang="de-DE" dirty="0"/>
+          </a:p>
+          <a:p>
             <a:endParaRPr lang="de-DE" dirty="0"/>
           </a:p>
         </p:txBody>
@@ -3597,8 +3623,11 @@
           <a:p>
             <a:r>
               <a:rPr lang="de-DE" dirty="0"/>
-              <a:t>Interne Kommunikation zwischen </a:t>
-            </a:r>
+              <a:t>Interne Kommunikation über Queue</a:t>
+            </a:r>
+          </a:p>
+          <a:p>
+            <a:endParaRPr lang="de-DE" dirty="0"/>
           </a:p>
         </p:txBody>
       </p:sp>
@@ -3697,8 +3726,11 @@
             </a:r>
             <a:r>
               <a:rPr lang="de-DE" dirty="0"/>
-              <a:t> Webservice </a:t>
-            </a:r>
+              <a:t> Webservice</a:t>
+            </a:r>
+          </a:p>
+          <a:p>
+            <a:endParaRPr lang="de-DE" dirty="0"/>
           </a:p>
         </p:txBody>
       </p:sp>
@@ -4088,6 +4120,56 @@
           </a:p>
         </p:txBody>
       </p:sp>
+      <p:sp>
+        <p:nvSpPr>
+          <p:cNvPr id="4" name="Inhaltsplatzhalter 2">
+            <a:extLst>
+              <a:ext uri="{FF2B5EF4-FFF2-40B4-BE49-F238E27FC236}">
+                <a16:creationId xmlns:a16="http://schemas.microsoft.com/office/drawing/2014/main" id="{13A59087-1A4E-22C9-ACC7-C83CBAED78EB}"/>
+              </a:ext>
+            </a:extLst>
+          </p:cNvPr>
+          <p:cNvSpPr>
+            <a:spLocks noGrp="1"/>
+          </p:cNvSpPr>
+          <p:nvPr>
+            <p:ph idx="1"/>
+          </p:nvPr>
+        </p:nvSpPr>
+        <p:spPr>
+          <a:xfrm>
+            <a:off x="838200" y="1825625"/>
+            <a:ext cx="10515600" cy="4351338"/>
+          </a:xfrm>
+        </p:spPr>
+        <p:txBody>
+          <a:bodyPr/>
+          <a:lstStyle/>
+          <a:p>
+            <a:r>
+              <a:rPr lang="de-DE" dirty="0"/>
+              <a:t>Kriterien:</a:t>
+            </a:r>
+          </a:p>
+          <a:p>
+            <a:pPr lvl="1"/>
+            <a:r>
+              <a:rPr lang="de-DE" dirty="0"/>
+              <a:t>Leichtes fachliches Projekt</a:t>
+            </a:r>
+          </a:p>
+          <a:p>
+            <a:pPr lvl="1"/>
+            <a:r>
+              <a:rPr lang="de-DE" dirty="0"/>
+              <a:t>Kleinere Services</a:t>
+            </a:r>
+          </a:p>
+          <a:p>
+            <a:endParaRPr lang="de-DE" dirty="0"/>
+          </a:p>
+        </p:txBody>
+      </p:sp>
     </p:spTree>
     <p:extLst>
       <p:ext uri="{BB962C8B-B14F-4D97-AF65-F5344CB8AC3E}">
@@ -4866,7 +4948,57 @@
           <a:bodyPr/>
           <a:lstStyle/>
           <a:p>
-            <a:endParaRPr lang="de-DE"/>
+            <a:r>
+              <a:rPr lang="de-DE" dirty="0"/>
+              <a:t>Vue</a:t>
+            </a:r>
+          </a:p>
+          <a:p>
+            <a:r>
+              <a:rPr lang="de-DE" dirty="0" err="1"/>
+              <a:t>Vuetify</a:t>
+            </a:r>
+            <a:r>
+              <a:rPr lang="de-DE" dirty="0"/>
+              <a:t> als </a:t>
+            </a:r>
+            <a:r>
+              <a:rPr lang="de-DE" dirty="0" err="1"/>
+              <a:t>Compontenten</a:t>
+            </a:r>
+            <a:r>
+              <a:rPr lang="de-DE" dirty="0"/>
+              <a:t> Framework</a:t>
+            </a:r>
+          </a:p>
+          <a:p>
+            <a:r>
+              <a:rPr lang="de-DE" dirty="0" err="1"/>
+              <a:t>Microfrontends</a:t>
+            </a:r>
+            <a:endParaRPr lang="de-DE" dirty="0"/>
+          </a:p>
+          <a:p>
+            <a:r>
+              <a:rPr lang="de-DE" dirty="0" err="1"/>
+              <a:t>Compontenten</a:t>
+            </a:r>
+            <a:r>
+              <a:rPr lang="de-DE" dirty="0"/>
+              <a:t> Kommunikation über Vue Store</a:t>
+            </a:r>
+          </a:p>
+          <a:p>
+            <a:endParaRPr lang="de-DE" dirty="0"/>
+          </a:p>
+          <a:p>
+            <a:pPr marL="0" indent="0">
+              <a:buNone/>
+            </a:pPr>
+            <a:r>
+              <a:rPr lang="de-DE" dirty="0"/>
+              <a:t>	</a:t>
+            </a:r>
           </a:p>
         </p:txBody>
       </p:sp>
@@ -4957,14 +5089,28 @@
           <a:p>
             <a:r>
               <a:rPr lang="de-DE" dirty="0"/>
-              <a:t>Cloud Stream</a:t>
-            </a:r>
-          </a:p>
-          <a:p>
-            <a:r>
-              <a:rPr lang="de-DE" dirty="0"/>
-              <a:t>Hibernate – ORM Framework</a:t>
-            </a:r>
+              <a:t>Cloud Stream - Unabhängigkeit von </a:t>
+            </a:r>
+            <a:r>
+              <a:rPr lang="de-DE" dirty="0" err="1"/>
+              <a:t>MessageBroker</a:t>
+            </a:r>
+            <a:endParaRPr lang="de-DE" dirty="0"/>
+          </a:p>
+          <a:p>
+            <a:r>
+              <a:rPr lang="de-DE" dirty="0"/>
+              <a:t>Hibernate - ORM Framework</a:t>
+            </a:r>
+          </a:p>
+          <a:p>
+            <a:r>
+              <a:rPr lang="de-DE" dirty="0"/>
+              <a:t>Maria DB Datenbank</a:t>
+            </a:r>
+          </a:p>
+          <a:p>
+            <a:endParaRPr lang="de-DE" dirty="0"/>
           </a:p>
           <a:p>
             <a:endParaRPr lang="de-DE" dirty="0"/>

</xml_diff>